<commit_message>
Update Caravanserai - Final Demo.pptx
</commit_message>
<xml_diff>
--- a/Presentations/Caravanserai - Final Demo.pptx
+++ b/Presentations/Caravanserai - Final Demo.pptx
@@ -7254,8 +7254,13 @@
           <a:p>
             <a:r>
               <a:rPr lang="en-US" dirty="0"/>
-              <a:t>Anna Milligan – Frontend</a:t>
-            </a:r>
+              <a:t>Anna Milligan </a:t>
+            </a:r>
+            <a:r>
+              <a:rPr lang="en-US"/>
+              <a:t>– Frontend, Reports</a:t>
+            </a:r>
+            <a:endParaRPr lang="en-US" dirty="0"/>
           </a:p>
           <a:p>
             <a:r>

</xml_diff>